<commit_message>
uebung angepasst an readme
</commit_message>
<xml_diff>
--- a/folien/Semester_03_Termin_09_Uebungsblock_05-08.pptx
+++ b/folien/Semester_03_Termin_09_Uebungsblock_05-08.pptx
@@ -6868,12 +6868,20 @@
               </a:tabLst>
             </a:pPr>
             <a:r>
-              <a:rPr lang="de-DE" sz="4000">
+              <a:rPr lang="de-DE" sz="4000" dirty="0" smtClean="0">
                 <a:solidFill>
                   <a:srgbClr val="FFFFFF"/>
                 </a:solidFill>
               </a:rPr>
-              <a:t>Übung 1 (3)</a:t>
+              <a:t>Teil </a:t>
+            </a:r>
+            <a:r>
+              <a:rPr lang="de-DE" sz="4000" dirty="0">
+                <a:solidFill>
+                  <a:srgbClr val="FFFFFF"/>
+                </a:solidFill>
+              </a:rPr>
+              <a:t>1 (3)</a:t>
             </a:r>
           </a:p>
         </p:txBody>
@@ -6926,37 +6934,37 @@
               </a:tabLst>
             </a:pPr>
             <a:r>
-              <a:rPr lang="de-DE" sz="2800"/>
+              <a:rPr lang="de-DE" sz="2800" dirty="0"/>
               <a:t>Erzeugen Sie eine Klasse </a:t>
             </a:r>
             <a:r>
-              <a:rPr lang="de-DE" sz="2800">
+              <a:rPr lang="de-DE" sz="2800" dirty="0">
                 <a:latin typeface="Courier New" pitchFamily="49" charset="0"/>
               </a:rPr>
               <a:t>Kartenhand</a:t>
             </a:r>
             <a:r>
-              <a:rPr lang="de-DE" sz="2800"/>
+              <a:rPr lang="de-DE" sz="2800" dirty="0"/>
               <a:t>, die bis zu</a:t>
             </a:r>
             <a:br>
-              <a:rPr lang="de-DE" sz="2800"/>
+              <a:rPr lang="de-DE" sz="2800" dirty="0"/>
             </a:br>
             <a:r>
-              <a:rPr lang="de-DE" sz="2800"/>
+              <a:rPr lang="de-DE" sz="2800" dirty="0"/>
               <a:t>21 Karten aufnehmen kann. Einer Kartenhand</a:t>
             </a:r>
             <a:br>
-              <a:rPr lang="de-DE" sz="2800"/>
+              <a:rPr lang="de-DE" sz="2800" dirty="0"/>
             </a:br>
             <a:r>
-              <a:rPr lang="de-DE" sz="2800"/>
+              <a:rPr lang="de-DE" sz="2800" dirty="0"/>
               <a:t>können Karten hinzugefügt werden.</a:t>
             </a:r>
             <a:br>
-              <a:rPr lang="de-DE" sz="2800"/>
+              <a:rPr lang="de-DE" sz="2800" dirty="0"/>
             </a:br>
-            <a:endParaRPr lang="de-DE" sz="2800"/>
+            <a:endParaRPr lang="de-DE" sz="2800" dirty="0"/>
           </a:p>
           <a:p>
             <a:pPr marL="269875" indent="-269875">
@@ -6982,8 +6990,16 @@
               </a:tabLst>
             </a:pPr>
             <a:r>
-              <a:rPr lang="de-DE" sz="2800"/>
-              <a:t>Eine Kartenhand soll Auskunft darüber geben, wieviele Punkte gemäß Black-Jack-Regeln sie gerade enthält (nach den Regeln für den Geber).</a:t>
+              <a:rPr lang="de-DE" sz="2800" dirty="0"/>
+              <a:t>Eine Kartenhand soll Auskunft darüber geben, </a:t>
+            </a:r>
+            <a:r>
+              <a:rPr lang="de-DE" sz="2800" dirty="0" err="1"/>
+              <a:t>wieviele</a:t>
+            </a:r>
+            <a:r>
+              <a:rPr lang="de-DE" sz="2800" dirty="0"/>
+              <a:t> Punkte gemäß Black-Jack-Regeln sie gerade enthält (nach den Regeln für den Geber).</a:t>
             </a:r>
           </a:p>
           <a:p>
@@ -7009,7 +7025,7 @@
                 <a:tab pos="8686800" algn="l"/>
               </a:tabLst>
             </a:pPr>
-            <a:endParaRPr lang="de-DE"/>
+            <a:endParaRPr lang="de-DE" dirty="0"/>
           </a:p>
           <a:p>
             <a:pPr marL="269875" indent="-269875">
@@ -7034,7 +7050,7 @@
                 <a:tab pos="8686800" algn="l"/>
               </a:tabLst>
             </a:pPr>
-            <a:endParaRPr lang="de-DE"/>
+            <a:endParaRPr lang="de-DE" dirty="0"/>
           </a:p>
         </p:txBody>
       </p:sp>
@@ -7214,12 +7230,20 @@
               </a:tabLst>
             </a:pPr>
             <a:r>
-              <a:rPr lang="de-DE" sz="4000">
+              <a:rPr lang="de-DE" sz="4000" dirty="0" smtClean="0">
                 <a:solidFill>
                   <a:srgbClr val="FFFFFF"/>
                 </a:solidFill>
               </a:rPr>
-              <a:t>Übung 1 (4)</a:t>
+              <a:t>Teil </a:t>
+            </a:r>
+            <a:r>
+              <a:rPr lang="de-DE" sz="4000" dirty="0">
+                <a:solidFill>
+                  <a:srgbClr val="FFFFFF"/>
+                </a:solidFill>
+              </a:rPr>
+              <a:t>1 (4)</a:t>
             </a:r>
           </a:p>
         </p:txBody>
@@ -7272,23 +7296,23 @@
               </a:tabLst>
             </a:pPr>
             <a:r>
-              <a:rPr lang="de-DE" sz="2800"/>
+              <a:rPr lang="de-DE" sz="2800" dirty="0"/>
               <a:t>Eine Kartenhand soll einen </a:t>
             </a:r>
             <a:r>
-              <a:rPr lang="de-DE" sz="2800">
+              <a:rPr lang="de-DE" sz="2800" dirty="0">
                 <a:latin typeface="Courier New" pitchFamily="49" charset="0"/>
               </a:rPr>
               <a:t>String</a:t>
             </a:r>
             <a:r>
-              <a:rPr lang="de-DE" sz="2800"/>
+              <a:rPr lang="de-DE" sz="2800" dirty="0"/>
               <a:t> zurückliefern können, der kurz aber übersichtlich beschreibt, welche Karten auf der Hand sind, z. B.: "Pik Bube, Karo Vier, Herz Sechs".</a:t>
             </a:r>
             <a:br>
-              <a:rPr lang="de-DE" sz="2800"/>
+              <a:rPr lang="de-DE" sz="2800" dirty="0"/>
             </a:br>
-            <a:endParaRPr lang="de-DE" sz="2800"/>
+            <a:endParaRPr lang="de-DE" sz="2800" dirty="0"/>
           </a:p>
           <a:p>
             <a:pPr marL="269875" indent="-269875">
@@ -7314,7 +7338,7 @@
               </a:tabLst>
             </a:pPr>
             <a:r>
-              <a:rPr lang="de-DE" sz="2800"/>
+              <a:rPr lang="de-DE" sz="2800" dirty="0"/>
               <a:t>Testen Sie ausführlich das Erstellen von Spielkarten, Kartenstapeln und Kartenhänden.</a:t>
             </a:r>
           </a:p>
@@ -7341,7 +7365,7 @@
                 <a:tab pos="8686800" algn="l"/>
               </a:tabLst>
             </a:pPr>
-            <a:endParaRPr lang="de-DE"/>
+            <a:endParaRPr lang="de-DE" dirty="0"/>
           </a:p>
           <a:p>
             <a:pPr marL="269875" indent="-269875">
@@ -7366,7 +7390,7 @@
                 <a:tab pos="8686800" algn="l"/>
               </a:tabLst>
             </a:pPr>
-            <a:endParaRPr lang="de-DE"/>
+            <a:endParaRPr lang="de-DE" dirty="0"/>
           </a:p>
         </p:txBody>
       </p:sp>
@@ -7546,12 +7570,20 @@
               </a:tabLst>
             </a:pPr>
             <a:r>
-              <a:rPr lang="de-DE" sz="4000">
+              <a:rPr lang="de-DE" sz="4000" dirty="0" smtClean="0">
                 <a:solidFill>
                   <a:srgbClr val="FFFFFF"/>
                 </a:solidFill>
               </a:rPr>
-              <a:t>Übung 2 (1)</a:t>
+              <a:t>Teil </a:t>
+            </a:r>
+            <a:r>
+              <a:rPr lang="de-DE" sz="4000" dirty="0">
+                <a:solidFill>
+                  <a:srgbClr val="FFFFFF"/>
+                </a:solidFill>
+              </a:rPr>
+              <a:t>2 (1)</a:t>
             </a:r>
           </a:p>
         </p:txBody>
@@ -7601,7 +7633,7 @@
               </a:tabLst>
             </a:pPr>
             <a:r>
-              <a:rPr lang="de-DE" sz="2800"/>
+              <a:rPr lang="de-DE" sz="2800" dirty="0"/>
               <a:t>Setzen Sie ein einfaches Black-Jack-Spiel um:</a:t>
             </a:r>
           </a:p>
@@ -7628,7 +7660,7 @@
                 <a:tab pos="8686800" algn="l"/>
               </a:tabLst>
             </a:pPr>
-            <a:endParaRPr lang="de-DE" sz="2800"/>
+            <a:endParaRPr lang="de-DE" sz="2800" dirty="0"/>
           </a:p>
           <a:p>
             <a:pPr marL="269875" indent="-269875">
@@ -7653,13 +7685,13 @@
               </a:tabLst>
             </a:pPr>
             <a:r>
-              <a:rPr lang="de-DE" sz="2800"/>
+              <a:rPr lang="de-DE" sz="2800" dirty="0"/>
               <a:t>Geber und Spieler erhalten eine Kartenhand.</a:t>
             </a:r>
             <a:br>
-              <a:rPr lang="de-DE" sz="2800"/>
+              <a:rPr lang="de-DE" sz="2800" dirty="0"/>
             </a:br>
-            <a:endParaRPr lang="de-DE" sz="2800"/>
+            <a:endParaRPr lang="de-DE" sz="2800" dirty="0"/>
           </a:p>
           <a:p>
             <a:pPr marL="269875" indent="-269875">
@@ -7684,36 +7716,52 @@
               </a:tabLst>
             </a:pPr>
             <a:r>
-              <a:rPr lang="de-DE" sz="2800"/>
+              <a:rPr lang="de-DE" sz="2800" dirty="0"/>
               <a:t>Dem Anwender (Spieler) werden die Kartenhände bekannt gegeben, und der Spieler wird nach seinem Spielzug gefragt – </a:t>
             </a:r>
             <a:r>
-              <a:rPr lang="de-DE" sz="2800" i="1"/>
-              <a:t>"stay"</a:t>
-            </a:r>
-            <a:r>
-              <a:rPr lang="de-DE" sz="2800"/>
+              <a:rPr lang="de-DE" sz="2800" i="1" dirty="0"/>
+              <a:t>"</a:t>
+            </a:r>
+            <a:r>
+              <a:rPr lang="de-DE" sz="2800" i="1" dirty="0" err="1"/>
+              <a:t>stay</a:t>
+            </a:r>
+            <a:r>
+              <a:rPr lang="de-DE" sz="2800" i="1" dirty="0"/>
+              <a:t>"</a:t>
+            </a:r>
+            <a:r>
+              <a:rPr lang="de-DE" sz="2800" dirty="0"/>
               <a:t> (bei 4. weiter) oder </a:t>
             </a:r>
             <a:r>
-              <a:rPr lang="de-DE" sz="2800" i="1"/>
-              <a:t>"hit"</a:t>
-            </a:r>
-            <a:r>
-              <a:rPr lang="de-DE" sz="2800"/>
+              <a:rPr lang="de-DE" sz="2800" i="1" dirty="0"/>
+              <a:t>"</a:t>
+            </a:r>
+            <a:r>
+              <a:rPr lang="de-DE" sz="2800" i="1" dirty="0" err="1"/>
+              <a:t>hit</a:t>
+            </a:r>
+            <a:r>
+              <a:rPr lang="de-DE" sz="2800" i="1" dirty="0"/>
+              <a:t>"</a:t>
+            </a:r>
+            <a:r>
+              <a:rPr lang="de-DE" sz="2800" dirty="0"/>
               <a:t> </a:t>
             </a:r>
             <a:br>
-              <a:rPr lang="de-DE" sz="2800"/>
+              <a:rPr lang="de-DE" sz="2800" dirty="0"/>
             </a:br>
             <a:r>
-              <a:rPr lang="de-DE" sz="2800"/>
+              <a:rPr lang="de-DE" sz="2800" dirty="0"/>
               <a:t>(bei 3. weiter).</a:t>
             </a:r>
             <a:br>
-              <a:rPr lang="de-DE" sz="2800"/>
+              <a:rPr lang="de-DE" sz="2800" dirty="0"/>
             </a:br>
-            <a:endParaRPr lang="de-DE" sz="2800"/>
+            <a:endParaRPr lang="de-DE" sz="2800" dirty="0"/>
           </a:p>
           <a:p>
             <a:pPr marL="269875" indent="-269875">
@@ -7738,29 +7786,37 @@
               </a:tabLst>
             </a:pPr>
             <a:r>
-              <a:rPr lang="de-DE" sz="2800"/>
+              <a:rPr lang="de-DE" sz="2800" dirty="0"/>
               <a:t>Der Spieler erhält eine Karte. Sind seine </a:t>
             </a:r>
             <a:br>
-              <a:rPr lang="de-DE" sz="2800"/>
+              <a:rPr lang="de-DE" sz="2800" dirty="0"/>
             </a:br>
             <a:r>
-              <a:rPr lang="de-DE" sz="2800"/>
+              <a:rPr lang="de-DE" sz="2800" dirty="0"/>
               <a:t>Punkte &lt; 22, geht es bei Punkt 2 weiter, sonst </a:t>
             </a:r>
             <a:br>
-              <a:rPr lang="de-DE" sz="2800"/>
+              <a:rPr lang="de-DE" sz="2800" dirty="0"/>
             </a:br>
             <a:r>
-              <a:rPr lang="de-DE" sz="2800"/>
+              <a:rPr lang="de-DE" sz="2800" dirty="0"/>
               <a:t>erhält er noch die Meldung </a:t>
             </a:r>
             <a:r>
-              <a:rPr lang="de-DE" sz="2800" i="1"/>
-              <a:t>"bust"</a:t>
-            </a:r>
-            <a:r>
-              <a:rPr lang="de-DE" sz="2800"/>
+              <a:rPr lang="de-DE" sz="2800" i="1" dirty="0"/>
+              <a:t>"</a:t>
+            </a:r>
+            <a:r>
+              <a:rPr lang="de-DE" sz="2800" i="1" dirty="0" err="1"/>
+              <a:t>bust</a:t>
+            </a:r>
+            <a:r>
+              <a:rPr lang="de-DE" sz="2800" i="1" dirty="0"/>
+              <a:t>"</a:t>
+            </a:r>
+            <a:r>
+              <a:rPr lang="de-DE" sz="2800" dirty="0"/>
               <a:t>, und das Spiel ist beendet.</a:t>
             </a:r>
           </a:p>
@@ -7787,7 +7843,7 @@
                 <a:tab pos="8686800" algn="l"/>
               </a:tabLst>
             </a:pPr>
-            <a:endParaRPr lang="de-DE"/>
+            <a:endParaRPr lang="de-DE" dirty="0"/>
           </a:p>
           <a:p>
             <a:pPr marL="269875" indent="-269875">
@@ -7812,7 +7868,7 @@
                 <a:tab pos="8686800" algn="l"/>
               </a:tabLst>
             </a:pPr>
-            <a:endParaRPr lang="de-DE"/>
+            <a:endParaRPr lang="de-DE" dirty="0"/>
           </a:p>
         </p:txBody>
       </p:sp>
@@ -7992,12 +8048,20 @@
               </a:tabLst>
             </a:pPr>
             <a:r>
-              <a:rPr lang="de-DE" sz="4000">
+              <a:rPr lang="de-DE" sz="4000" dirty="0">
                 <a:solidFill>
                   <a:srgbClr val="FFFFFF"/>
                 </a:solidFill>
               </a:rPr>
-              <a:t>Übung 2 (2)</a:t>
+              <a:t>Teil </a:t>
+            </a:r>
+            <a:r>
+              <a:rPr lang="de-DE" sz="4000" dirty="0">
+                <a:solidFill>
+                  <a:srgbClr val="FFFFFF"/>
+                </a:solidFill>
+              </a:rPr>
+              <a:t>2 (2)</a:t>
             </a:r>
           </a:p>
         </p:txBody>
@@ -8046,7 +8110,7 @@
                 <a:tab pos="8686800" algn="l"/>
               </a:tabLst>
             </a:pPr>
-            <a:endParaRPr lang="de-DE" sz="2800"/>
+            <a:endParaRPr lang="de-DE" sz="2800" dirty="0"/>
           </a:p>
           <a:p>
             <a:pPr marL="449263" indent="-449263">
@@ -8071,13 +8135,13 @@
               </a:tabLst>
             </a:pPr>
             <a:r>
-              <a:rPr lang="de-DE" sz="2800"/>
+              <a:rPr lang="de-DE" sz="2800" dirty="0"/>
               <a:t>Der Geber zieht nun gemäß den Regeln seine Karten und informiert nach jedem Zug den Anwender über die Kartenhände.</a:t>
             </a:r>
             <a:br>
-              <a:rPr lang="de-DE" sz="2800"/>
+              <a:rPr lang="de-DE" sz="2800" dirty="0"/>
             </a:br>
-            <a:endParaRPr lang="de-DE" sz="2800"/>
+            <a:endParaRPr lang="de-DE" sz="2800" dirty="0"/>
           </a:p>
           <a:p>
             <a:pPr marL="449263" indent="-449263">
@@ -8102,7 +8166,7 @@
               </a:tabLst>
             </a:pPr>
             <a:r>
-              <a:rPr lang="de-DE" sz="2800"/>
+              <a:rPr lang="de-DE" sz="2800" dirty="0"/>
               <a:t>Sobald der Geber mehr als 16 Punkte auf der Hand hat, wird das Spielergebnis ausgewertet und der Anwender über das Ergebnis informiert.</a:t>
             </a:r>
           </a:p>
@@ -8126,7 +8190,7 @@
                 <a:tab pos="8686800" algn="l"/>
               </a:tabLst>
             </a:pPr>
-            <a:endParaRPr lang="de-DE" sz="2800"/>
+            <a:endParaRPr lang="de-DE" sz="2800" dirty="0"/>
           </a:p>
           <a:p>
             <a:pPr marL="449263" indent="-449263">
@@ -8151,7 +8215,7 @@
                 <a:tab pos="8686800" algn="l"/>
               </a:tabLst>
             </a:pPr>
-            <a:endParaRPr lang="de-DE"/>
+            <a:endParaRPr lang="de-DE" dirty="0"/>
           </a:p>
           <a:p>
             <a:pPr marL="449263" indent="-449263">
@@ -8176,7 +8240,7 @@
                 <a:tab pos="8686800" algn="l"/>
               </a:tabLst>
             </a:pPr>
-            <a:endParaRPr lang="de-DE"/>
+            <a:endParaRPr lang="de-DE" dirty="0"/>
           </a:p>
         </p:txBody>
       </p:sp>
@@ -8414,13 +8478,13 @@
               </a:tabLst>
             </a:pPr>
             <a:r>
-              <a:rPr lang="de-DE" sz="2800"/>
+              <a:rPr lang="de-DE" sz="2800" dirty="0"/>
               <a:t>Vor dem Spiel können Geldeinsätze getätigt werden (bis zu vorgegebenen Limits). Der Gewinn entspricht nach den bisherigen Regeln immer dem Einsatz.</a:t>
             </a:r>
             <a:br>
-              <a:rPr lang="de-DE" sz="2800"/>
+              <a:rPr lang="de-DE" sz="2800" dirty="0"/>
             </a:br>
-            <a:endParaRPr lang="de-DE" sz="2800"/>
+            <a:endParaRPr lang="de-DE" sz="2800" dirty="0"/>
           </a:p>
           <a:p>
             <a:pPr marL="269875" indent="-269875">
@@ -8446,13 +8510,13 @@
               </a:tabLst>
             </a:pPr>
             <a:r>
-              <a:rPr lang="de-DE" sz="2800"/>
+              <a:rPr lang="de-DE" sz="2800" dirty="0"/>
               <a:t>Hat ein Spieler einen Siebener-Drilling, so gewinnt er sofort im Verhältnis 3:2 (also das 1,5-fache des Einsatzes) und das Spiel ist beendet. </a:t>
             </a:r>
             <a:br>
-              <a:rPr lang="de-DE" sz="2800"/>
+              <a:rPr lang="de-DE" sz="2800" dirty="0"/>
             </a:br>
-            <a:endParaRPr lang="de-DE" sz="2800"/>
+            <a:endParaRPr lang="de-DE" sz="2800" dirty="0"/>
           </a:p>
           <a:p>
             <a:pPr marL="269875" indent="-269875">
@@ -8478,7 +8542,7 @@
               </a:tabLst>
             </a:pPr>
             <a:r>
-              <a:rPr lang="de-DE" sz="2800"/>
+              <a:rPr lang="de-DE" sz="2800" dirty="0"/>
               <a:t>Ein "Black Jack" ist eine Kartenhand mit nur 2 Karten, die bereits 21 ergeben. Sie zählt mehr als andere Kartenhände, die 21 ergeben und gewinnt gegenüber diesen. Gewinnt der Spieler mit einem "Black Jack", so tut er dies im Verhältnis 3:2.</a:t>
             </a:r>
           </a:p>
@@ -8505,7 +8569,7 @@
                 <a:tab pos="8686800" algn="l"/>
               </a:tabLst>
             </a:pPr>
-            <a:endParaRPr lang="de-DE"/>
+            <a:endParaRPr lang="de-DE" dirty="0"/>
           </a:p>
           <a:p>
             <a:pPr marL="269875" indent="-269875">
@@ -8530,7 +8594,7 @@
                 <a:tab pos="8686800" algn="l"/>
               </a:tabLst>
             </a:pPr>
-            <a:endParaRPr lang="de-DE"/>
+            <a:endParaRPr lang="de-DE" dirty="0"/>
           </a:p>
         </p:txBody>
       </p:sp>
@@ -8710,12 +8774,20 @@
               </a:tabLst>
             </a:pPr>
             <a:r>
-              <a:rPr lang="de-DE" sz="4000">
+              <a:rPr lang="de-DE" sz="4000" dirty="0">
                 <a:solidFill>
                   <a:srgbClr val="FFFFFF"/>
                 </a:solidFill>
               </a:rPr>
-              <a:t>Übung 3</a:t>
+              <a:t>Teil </a:t>
+            </a:r>
+            <a:r>
+              <a:rPr lang="de-DE" sz="4000" dirty="0">
+                <a:solidFill>
+                  <a:srgbClr val="FFFFFF"/>
+                </a:solidFill>
+              </a:rPr>
+              <a:t>3</a:t>
             </a:r>
           </a:p>
         </p:txBody>
@@ -8768,13 +8840,13 @@
               </a:tabLst>
             </a:pPr>
             <a:r>
-              <a:rPr lang="de-DE" sz="2800"/>
+              <a:rPr lang="de-DE" sz="2800" dirty="0"/>
               <a:t>Ergänzen Sie das Black-Jack-Spiel derart, dass nach einer Runde das Spiel nicht zwangsläufig beendet ist, sondern der Anwender gefragt wird, ob er noch eine Runde spielen möchte.</a:t>
             </a:r>
             <a:br>
-              <a:rPr lang="de-DE" sz="2800"/>
+              <a:rPr lang="de-DE" sz="2800" dirty="0"/>
             </a:br>
-            <a:endParaRPr lang="de-DE" sz="2800"/>
+            <a:endParaRPr lang="de-DE" sz="2800" dirty="0"/>
           </a:p>
           <a:p>
             <a:pPr marL="269875" indent="-269875">
@@ -8800,14 +8872,14 @@
               </a:tabLst>
             </a:pPr>
             <a:r>
-              <a:rPr lang="de-DE" sz="2800"/>
+              <a:rPr lang="de-DE" sz="2800" dirty="0"/>
               <a:t>Der Spieler soll nun beim Programmstart ein Budget von 5000 Euro haben und vor jedem Spiel einen Teilbetrag (Limit 1000 Euro) setzen dürfen.</a:t>
             </a:r>
             <a:br>
-              <a:rPr lang="de-DE" sz="2800"/>
+              <a:rPr lang="de-DE" sz="2800" dirty="0"/>
             </a:br>
             <a:r>
-              <a:rPr lang="de-DE" sz="2800"/>
+              <a:rPr lang="de-DE" sz="2800" dirty="0"/>
               <a:t> </a:t>
             </a:r>
           </a:p>
@@ -8835,14 +8907,14 @@
               </a:tabLst>
             </a:pPr>
             <a:r>
-              <a:rPr lang="de-DE" sz="2800"/>
+              <a:rPr lang="de-DE" sz="2800" dirty="0"/>
               <a:t>Setzen Sie zuerst eine einfache Gewinnausschüttung um. Ergänzen Sie dann die speziellen Ausschüttungsregeln für "Siebener-Drilling" und </a:t>
             </a:r>
             <a:br>
-              <a:rPr lang="de-DE" sz="2800"/>
+              <a:rPr lang="de-DE" sz="2800" dirty="0"/>
             </a:br>
             <a:r>
-              <a:rPr lang="de-DE" sz="2800"/>
+              <a:rPr lang="de-DE" sz="2800" dirty="0"/>
               <a:t>"Black Jack".</a:t>
             </a:r>
           </a:p>
@@ -8869,7 +8941,7 @@
                 <a:tab pos="8686800" algn="l"/>
               </a:tabLst>
             </a:pPr>
-            <a:endParaRPr lang="de-DE"/>
+            <a:endParaRPr lang="de-DE" dirty="0"/>
           </a:p>
           <a:p>
             <a:pPr marL="269875" indent="-269875">
@@ -8894,7 +8966,7 @@
                 <a:tab pos="8686800" algn="l"/>
               </a:tabLst>
             </a:pPr>
-            <a:endParaRPr lang="de-DE"/>
+            <a:endParaRPr lang="de-DE" dirty="0"/>
           </a:p>
         </p:txBody>
       </p:sp>
@@ -9074,13 +9146,26 @@
               </a:tabLst>
             </a:pPr>
             <a:r>
-              <a:rPr lang="de-DE" sz="4000">
+              <a:rPr lang="de-DE" sz="4000" dirty="0">
                 <a:solidFill>
                   <a:srgbClr val="FFFFFF"/>
                 </a:solidFill>
               </a:rPr>
-              <a:t>Erweiterte Regeln II</a:t>
-            </a:r>
+              <a:t>Erweiterte Regeln </a:t>
+            </a:r>
+            <a:r>
+              <a:rPr lang="de-DE" sz="4000" dirty="0" smtClean="0">
+                <a:solidFill>
+                  <a:srgbClr val="FFFFFF"/>
+                </a:solidFill>
+              </a:rPr>
+              <a:t>II (1)</a:t>
+            </a:r>
+            <a:endParaRPr lang="de-DE" sz="4000" dirty="0">
+              <a:solidFill>
+                <a:srgbClr val="FFFFFF"/>
+              </a:solidFill>
+            </a:endParaRPr>
           </a:p>
         </p:txBody>
       </p:sp>
@@ -9129,7 +9214,7 @@
               </a:tabLst>
             </a:pPr>
             <a:r>
-              <a:rPr lang="de-DE" sz="2800"/>
+              <a:rPr lang="de-DE" sz="2800" dirty="0"/>
               <a:t>double-Regel:</a:t>
             </a:r>
           </a:p>
@@ -9153,7 +9238,7 @@
                 <a:tab pos="8686800" algn="l"/>
               </a:tabLst>
             </a:pPr>
-            <a:endParaRPr lang="de-DE" sz="2800"/>
+            <a:endParaRPr lang="de-DE" sz="2800" dirty="0"/>
           </a:p>
           <a:p>
             <a:pPr marL="269875" indent="-269875">
@@ -9176,7 +9261,7 @@
               </a:tabLst>
             </a:pPr>
             <a:r>
-              <a:rPr lang="de-DE" sz="2800"/>
+              <a:rPr lang="de-DE" sz="2800" dirty="0"/>
               <a:t>Nachdem die ersten beiden Karten des Spielers</a:t>
             </a:r>
           </a:p>
@@ -9201,7 +9286,7 @@
               </a:tabLst>
             </a:pPr>
             <a:r>
-              <a:rPr lang="de-DE" sz="2800"/>
+              <a:rPr lang="de-DE" sz="2800" dirty="0"/>
               <a:t>aufgedeckt worden sind (die erste Karte des Gebers ist</a:t>
             </a:r>
           </a:p>
@@ -9226,7 +9311,7 @@
               </a:tabLst>
             </a:pPr>
             <a:r>
-              <a:rPr lang="de-DE" sz="2800"/>
+              <a:rPr lang="de-DE" sz="2800" dirty="0"/>
               <a:t>auch schon bekannt), hat der Spieler die Möglichkeit,</a:t>
             </a:r>
           </a:p>
@@ -9251,7 +9336,7 @@
               </a:tabLst>
             </a:pPr>
             <a:r>
-              <a:rPr lang="de-DE" sz="2800"/>
+              <a:rPr lang="de-DE" sz="2800" dirty="0"/>
               <a:t>seinen Einsatz zu verdoppeln (double).</a:t>
             </a:r>
           </a:p>
@@ -9275,7 +9360,7 @@
                 <a:tab pos="8686800" algn="l"/>
               </a:tabLst>
             </a:pPr>
-            <a:endParaRPr lang="de-DE" sz="2800"/>
+            <a:endParaRPr lang="de-DE" sz="2800" dirty="0"/>
           </a:p>
           <a:p>
             <a:pPr marL="269875" indent="-269875">
@@ -9298,7 +9383,7 @@
               </a:tabLst>
             </a:pPr>
             <a:r>
-              <a:rPr lang="de-DE" sz="2800"/>
+              <a:rPr lang="de-DE" sz="2800" dirty="0"/>
               <a:t>Wählt er diese Option, so bedeutet dies aber auch, </a:t>
             </a:r>
           </a:p>
@@ -9323,7 +9408,7 @@
               </a:tabLst>
             </a:pPr>
             <a:r>
-              <a:rPr lang="de-DE" sz="2800"/>
+              <a:rPr lang="de-DE" sz="2800" dirty="0"/>
               <a:t>dass er danach exakt eine Karte bekommt. Er kann</a:t>
             </a:r>
           </a:p>
@@ -9348,7 +9433,7 @@
               </a:tabLst>
             </a:pPr>
             <a:r>
-              <a:rPr lang="de-DE" sz="2800"/>
+              <a:rPr lang="de-DE" sz="2800" dirty="0"/>
               <a:t>darauf weder verzichten noch eine weitere fordern.</a:t>
             </a:r>
           </a:p>
@@ -9372,7 +9457,7 @@
                 <a:tab pos="8686800" algn="l"/>
               </a:tabLst>
             </a:pPr>
-            <a:endParaRPr lang="de-DE" sz="2800"/>
+            <a:endParaRPr lang="de-DE" sz="2800" dirty="0"/>
           </a:p>
           <a:p>
             <a:pPr marL="269875" indent="-269875">
@@ -9397,7 +9482,7 @@
                 <a:tab pos="8686800" algn="l"/>
               </a:tabLst>
             </a:pPr>
-            <a:endParaRPr lang="de-DE"/>
+            <a:endParaRPr lang="de-DE" dirty="0"/>
           </a:p>
           <a:p>
             <a:pPr marL="269875" indent="-269875">
@@ -9422,7 +9507,7 @@
                 <a:tab pos="8686800" algn="l"/>
               </a:tabLst>
             </a:pPr>
-            <a:endParaRPr lang="de-DE"/>
+            <a:endParaRPr lang="de-DE" dirty="0"/>
           </a:p>
         </p:txBody>
       </p:sp>
@@ -9602,13 +9687,26 @@
               </a:tabLst>
             </a:pPr>
             <a:r>
-              <a:rPr lang="de-DE" sz="4000">
+              <a:rPr lang="de-DE" sz="4000" dirty="0">
                 <a:solidFill>
                   <a:srgbClr val="FFFFFF"/>
                 </a:solidFill>
               </a:rPr>
-              <a:t>Erweiterte Regeln III</a:t>
-            </a:r>
+              <a:t>Erweiterte Regeln </a:t>
+            </a:r>
+            <a:r>
+              <a:rPr lang="de-DE" sz="4000" dirty="0" smtClean="0">
+                <a:solidFill>
+                  <a:srgbClr val="FFFFFF"/>
+                </a:solidFill>
+              </a:rPr>
+              <a:t>II (2)</a:t>
+            </a:r>
+            <a:endParaRPr lang="de-DE" sz="4000" dirty="0">
+              <a:solidFill>
+                <a:srgbClr val="FFFFFF"/>
+              </a:solidFill>
+            </a:endParaRPr>
           </a:p>
         </p:txBody>
       </p:sp>
@@ -9657,8 +9755,12 @@
               </a:tabLst>
             </a:pPr>
             <a:r>
-              <a:rPr lang="de-DE" sz="2600"/>
-              <a:t>insurance-Regel:</a:t>
+              <a:rPr lang="de-DE" sz="2600" dirty="0" err="1"/>
+              <a:t>insurance</a:t>
+            </a:r>
+            <a:r>
+              <a:rPr lang="de-DE" sz="2600" dirty="0"/>
+              <a:t>-Regel:</a:t>
             </a:r>
           </a:p>
           <a:p>
@@ -9681,7 +9783,7 @@
                 <a:tab pos="8686800" algn="l"/>
               </a:tabLst>
             </a:pPr>
-            <a:endParaRPr lang="de-DE" sz="2600"/>
+            <a:endParaRPr lang="de-DE" sz="2600" dirty="0"/>
           </a:p>
           <a:p>
             <a:pPr marL="0" indent="0">
@@ -9704,7 +9806,7 @@
               </a:tabLst>
             </a:pPr>
             <a:r>
-              <a:rPr lang="de-DE" sz="2600"/>
+              <a:rPr lang="de-DE" sz="2600" dirty="0"/>
               <a:t>Hat der Geber als erste Karte ein Ass, kann der Spieler sich</a:t>
             </a:r>
           </a:p>
@@ -9729,7 +9831,7 @@
               </a:tabLst>
             </a:pPr>
             <a:r>
-              <a:rPr lang="de-DE" sz="2600"/>
+              <a:rPr lang="de-DE" sz="2600" dirty="0"/>
               <a:t>gegen einen Black Jack des Gebers "versichern". Der Spieler</a:t>
             </a:r>
           </a:p>
@@ -9754,7 +9856,7 @@
               </a:tabLst>
             </a:pPr>
             <a:r>
-              <a:rPr lang="de-DE" sz="2600"/>
+              <a:rPr lang="de-DE" sz="2600" dirty="0"/>
               <a:t>kann dann mit einer sog. Versicherungsprämie (beliebiger</a:t>
             </a:r>
           </a:p>
@@ -9779,8 +9881,16 @@
               </a:tabLst>
             </a:pPr>
             <a:r>
-              <a:rPr lang="de-DE" sz="2600"/>
-              <a:t>Betrag &lt;= Limits) eine Nebenwette darauf abschliessen, </a:t>
+              <a:rPr lang="de-DE" sz="2600" dirty="0"/>
+              <a:t>Betrag &lt;= Limits) eine Nebenwette darauf </a:t>
+            </a:r>
+            <a:r>
+              <a:rPr lang="de-DE" sz="2600" dirty="0" err="1"/>
+              <a:t>abschliessen</a:t>
+            </a:r>
+            <a:r>
+              <a:rPr lang="de-DE" sz="2600" dirty="0"/>
+              <a:t>, </a:t>
             </a:r>
           </a:p>
           <a:p>
@@ -9804,7 +9914,7 @@
               </a:tabLst>
             </a:pPr>
             <a:r>
-              <a:rPr lang="de-DE" sz="2600"/>
+              <a:rPr lang="de-DE" sz="2600" dirty="0"/>
               <a:t>dass der Geber einen Black Jack erhalten wird. </a:t>
             </a:r>
           </a:p>
@@ -9828,7 +9938,7 @@
                 <a:tab pos="8686800" algn="l"/>
               </a:tabLst>
             </a:pPr>
-            <a:endParaRPr lang="de-DE" sz="2600"/>
+            <a:endParaRPr lang="de-DE" sz="2600" dirty="0"/>
           </a:p>
           <a:p>
             <a:pPr marL="0" indent="0">
@@ -9851,7 +9961,7 @@
               </a:tabLst>
             </a:pPr>
             <a:r>
-              <a:rPr lang="de-DE" sz="2600"/>
+              <a:rPr lang="de-DE" sz="2600" dirty="0"/>
               <a:t>Erhält der Geber tatsächlich einen Black Jack, so gewinnt </a:t>
             </a:r>
           </a:p>
@@ -9876,7 +9986,7 @@
               </a:tabLst>
             </a:pPr>
             <a:r>
-              <a:rPr lang="de-DE" sz="2600"/>
+              <a:rPr lang="de-DE" sz="2600" dirty="0"/>
               <a:t>der Spieler die Nebenwette 2:1. Erhält der Geber keinen</a:t>
             </a:r>
           </a:p>
@@ -9901,7 +10011,7 @@
               </a:tabLst>
             </a:pPr>
             <a:r>
-              <a:rPr lang="de-DE" sz="2600"/>
+              <a:rPr lang="de-DE" sz="2600" dirty="0"/>
               <a:t>Black Jack, so wird die Versicherungsprämie einbehalten.</a:t>
             </a:r>
           </a:p>
@@ -9925,7 +10035,7 @@
                 <a:tab pos="8686800" algn="l"/>
               </a:tabLst>
             </a:pPr>
-            <a:endParaRPr lang="de-DE" sz="2600"/>
+            <a:endParaRPr lang="de-DE" sz="2600" dirty="0"/>
           </a:p>
           <a:p>
             <a:pPr marL="0" indent="0">
@@ -9948,8 +10058,16 @@
               </a:tabLst>
             </a:pPr>
             <a:r>
-              <a:rPr lang="de-DE" sz="2600"/>
-              <a:t>Diese Versicherung hat keinen Einfluß auf Gewinn oder</a:t>
+              <a:rPr lang="de-DE" sz="2600" dirty="0"/>
+              <a:t>Diese Versicherung hat keinen </a:t>
+            </a:r>
+            <a:r>
+              <a:rPr lang="de-DE" sz="2600" dirty="0" err="1"/>
+              <a:t>Einfluß</a:t>
+            </a:r>
+            <a:r>
+              <a:rPr lang="de-DE" sz="2600" dirty="0"/>
+              <a:t> auf Gewinn oder</a:t>
             </a:r>
           </a:p>
           <a:p>
@@ -9973,7 +10091,7 @@
               </a:tabLst>
             </a:pPr>
             <a:r>
-              <a:rPr lang="de-DE" sz="2600"/>
+              <a:rPr lang="de-DE" sz="2600" dirty="0"/>
               <a:t>Verlust im übrigen Spiel.</a:t>
             </a:r>
           </a:p>
@@ -10155,12 +10273,20 @@
               </a:tabLst>
             </a:pPr>
             <a:r>
-              <a:rPr lang="de-DE" sz="4000">
+              <a:rPr lang="de-DE" sz="4000" dirty="0">
                 <a:solidFill>
                   <a:srgbClr val="FFFFFF"/>
                 </a:solidFill>
               </a:rPr>
-              <a:t>Übung 4</a:t>
+              <a:t>Teil </a:t>
+            </a:r>
+            <a:r>
+              <a:rPr lang="de-DE" sz="4000" dirty="0">
+                <a:solidFill>
+                  <a:srgbClr val="FFFFFF"/>
+                </a:solidFill>
+              </a:rPr>
+              <a:t>4</a:t>
             </a:r>
           </a:p>
         </p:txBody>
@@ -10213,13 +10339,13 @@
               </a:tabLst>
             </a:pPr>
             <a:r>
-              <a:rPr lang="de-DE" sz="2800"/>
+              <a:rPr lang="de-DE" sz="2800" dirty="0"/>
               <a:t>Setzen Sie die double-Regel um.</a:t>
             </a:r>
             <a:br>
-              <a:rPr lang="de-DE" sz="2800"/>
+              <a:rPr lang="de-DE" sz="2800" dirty="0"/>
             </a:br>
-            <a:endParaRPr lang="de-DE" sz="2800"/>
+            <a:endParaRPr lang="de-DE" sz="2800" dirty="0"/>
           </a:p>
           <a:p>
             <a:pPr marL="269875" indent="-269875">
@@ -10245,8 +10371,16 @@
               </a:tabLst>
             </a:pPr>
             <a:r>
-              <a:rPr lang="de-DE" sz="2800"/>
-              <a:t>Setzen Sie die insurance-Regel um.</a:t>
+              <a:rPr lang="de-DE" sz="2800" dirty="0"/>
+              <a:t>Setzen Sie die </a:t>
+            </a:r>
+            <a:r>
+              <a:rPr lang="de-DE" sz="2800" dirty="0" err="1"/>
+              <a:t>insurance</a:t>
+            </a:r>
+            <a:r>
+              <a:rPr lang="de-DE" sz="2800" dirty="0"/>
+              <a:t>-Regel um.</a:t>
             </a:r>
           </a:p>
           <a:p>
@@ -10272,7 +10406,7 @@
                 <a:tab pos="8686800" algn="l"/>
               </a:tabLst>
             </a:pPr>
-            <a:endParaRPr lang="de-DE"/>
+            <a:endParaRPr lang="de-DE" dirty="0"/>
           </a:p>
           <a:p>
             <a:pPr marL="269875" indent="-269875">
@@ -10297,7 +10431,7 @@
                 <a:tab pos="8686800" algn="l"/>
               </a:tabLst>
             </a:pPr>
-            <a:endParaRPr lang="de-DE"/>
+            <a:endParaRPr lang="de-DE" dirty="0"/>
           </a:p>
         </p:txBody>
       </p:sp>
@@ -10816,7 +10950,7 @@
               </a:tabLst>
             </a:pPr>
             <a:r>
-              <a:rPr lang="de-DE"/>
+              <a:rPr lang="de-DE" dirty="0"/>
               <a:t>Ziel ist es, das Spiel "Black Jack" umzusetzen.</a:t>
             </a:r>
           </a:p>
@@ -10840,7 +10974,7 @@
                 <a:tab pos="8686800" algn="l"/>
               </a:tabLst>
             </a:pPr>
-            <a:endParaRPr lang="de-DE"/>
+            <a:endParaRPr lang="de-DE" dirty="0"/>
           </a:p>
           <a:p>
             <a:pPr marL="0" indent="0">
@@ -10863,7 +10997,7 @@
               </a:tabLst>
             </a:pPr>
             <a:r>
-              <a:rPr lang="de-DE"/>
+              <a:rPr lang="de-DE" dirty="0"/>
               <a:t>Zuerst soll nur ein sehr einfacher Regelsatz</a:t>
             </a:r>
           </a:p>
@@ -10888,7 +11022,7 @@
               </a:tabLst>
             </a:pPr>
             <a:r>
-              <a:rPr lang="de-DE"/>
+              <a:rPr lang="de-DE" dirty="0"/>
               <a:t>realisiert werden, der dann immer mehr den</a:t>
             </a:r>
           </a:p>
@@ -10913,7 +11047,7 @@
               </a:tabLst>
             </a:pPr>
             <a:r>
-              <a:rPr lang="de-DE"/>
+              <a:rPr lang="de-DE" dirty="0"/>
               <a:t>Casino-Regeln angepasst wird.</a:t>
             </a:r>
           </a:p>
@@ -10937,7 +11071,7 @@
                 <a:tab pos="8686800" algn="l"/>
               </a:tabLst>
             </a:pPr>
-            <a:endParaRPr lang="de-DE"/>
+            <a:endParaRPr lang="de-DE" dirty="0"/>
           </a:p>
           <a:p>
             <a:pPr marL="0" indent="0">
@@ -10962,7 +11096,7 @@
                 <a:tab pos="8686800" algn="l"/>
               </a:tabLst>
             </a:pPr>
-            <a:endParaRPr lang="de-DE"/>
+            <a:endParaRPr lang="de-DE" dirty="0"/>
           </a:p>
         </p:txBody>
       </p:sp>
@@ -11200,13 +11334,13 @@
               </a:tabLst>
             </a:pPr>
             <a:r>
-              <a:rPr lang="de-DE" sz="2800"/>
+              <a:rPr lang="de-DE" sz="2800" dirty="0"/>
               <a:t>Das Spiel besteht aus nur einem Spieler (Anwender) und dem Kartengeber (Computer).</a:t>
             </a:r>
             <a:br>
-              <a:rPr lang="de-DE" sz="2800"/>
+              <a:rPr lang="de-DE" sz="2800" dirty="0"/>
             </a:br>
-            <a:endParaRPr lang="de-DE" sz="2800"/>
+            <a:endParaRPr lang="de-DE" sz="2800" dirty="0"/>
           </a:p>
           <a:p>
             <a:pPr marL="269875" indent="-269875">
@@ -11232,14 +11366,14 @@
               </a:tabLst>
             </a:pPr>
             <a:r>
-              <a:rPr lang="de-DE" sz="2800"/>
+              <a:rPr lang="de-DE" sz="2800" dirty="0"/>
               <a:t>Gespielt wird mit einem 52-Karten-Blatt (in Casinos häufig auch mit 6x52 Karten).</a:t>
             </a:r>
             <a:br>
-              <a:rPr lang="de-DE" sz="2800"/>
+              <a:rPr lang="de-DE" sz="2800" dirty="0"/>
             </a:br>
             <a:r>
-              <a:rPr lang="de-DE" sz="2800"/>
+              <a:rPr lang="de-DE" sz="2800" dirty="0"/>
               <a:t> </a:t>
             </a:r>
           </a:p>
@@ -11267,13 +11401,13 @@
               </a:tabLst>
             </a:pPr>
             <a:r>
-              <a:rPr lang="de-DE" sz="2800"/>
+              <a:rPr lang="de-DE" sz="2800" dirty="0"/>
               <a:t>Der Kartengeber gibt dem Spieler zwei offene Karten und sich selbst eine offene Karte.</a:t>
             </a:r>
             <a:br>
-              <a:rPr lang="de-DE" sz="2800"/>
+              <a:rPr lang="de-DE" sz="2800" dirty="0"/>
             </a:br>
-            <a:endParaRPr lang="de-DE" sz="2800"/>
+            <a:endParaRPr lang="de-DE" sz="2800" dirty="0"/>
           </a:p>
           <a:p>
             <a:pPr marL="269875" indent="-269875">
@@ -11299,23 +11433,23 @@
               </a:tabLst>
             </a:pPr>
             <a:r>
-              <a:rPr lang="de-DE" sz="2800"/>
+              <a:rPr lang="de-DE" sz="2800" dirty="0"/>
               <a:t>Dann kann der Spieler entscheiden, ob er eine weitere Karte erhalten möchte (sog. </a:t>
             </a:r>
             <a:r>
-              <a:rPr lang="de-DE" sz="2800" i="1"/>
+              <a:rPr lang="de-DE" sz="2800" i="1" dirty="0" err="1"/>
               <a:t>hit</a:t>
             </a:r>
             <a:r>
-              <a:rPr lang="de-DE" sz="2800"/>
+              <a:rPr lang="de-DE" sz="2800" dirty="0"/>
               <a:t>) oder lieber keine weiteren Karten erhalten möchte (sog. </a:t>
             </a:r>
             <a:r>
-              <a:rPr lang="de-DE" sz="2800" i="1"/>
+              <a:rPr lang="de-DE" sz="2800" i="1" dirty="0" err="1"/>
               <a:t>stay</a:t>
             </a:r>
             <a:r>
-              <a:rPr lang="de-DE" sz="2800"/>
+              <a:rPr lang="de-DE" sz="2800" dirty="0"/>
               <a:t>).</a:t>
             </a:r>
           </a:p>
@@ -11342,7 +11476,7 @@
                 <a:tab pos="8686800" algn="l"/>
               </a:tabLst>
             </a:pPr>
-            <a:endParaRPr lang="de-DE"/>
+            <a:endParaRPr lang="de-DE" dirty="0"/>
           </a:p>
           <a:p>
             <a:pPr marL="269875" indent="-269875">
@@ -11367,7 +11501,7 @@
                 <a:tab pos="8686800" algn="l"/>
               </a:tabLst>
             </a:pPr>
-            <a:endParaRPr lang="de-DE"/>
+            <a:endParaRPr lang="de-DE" dirty="0"/>
           </a:p>
         </p:txBody>
       </p:sp>
@@ -11605,28 +11739,28 @@
               </a:tabLst>
             </a:pPr>
             <a:r>
-              <a:rPr lang="de-DE" sz="2800"/>
+              <a:rPr lang="de-DE" sz="2800" dirty="0"/>
               <a:t>Ziel ist es, so dicht wie möglich an 21 Punkte heranzukommen, diese aber nicht zu übertreffen</a:t>
             </a:r>
             <a:br>
-              <a:rPr lang="de-DE" sz="2800"/>
+              <a:rPr lang="de-DE" sz="2800" dirty="0"/>
             </a:br>
             <a:r>
-              <a:rPr lang="de-DE" sz="2800"/>
+              <a:rPr lang="de-DE" sz="2800" dirty="0"/>
               <a:t>(sog. </a:t>
             </a:r>
             <a:r>
-              <a:rPr lang="de-DE" sz="2800" i="1"/>
+              <a:rPr lang="de-DE" sz="2800" i="1" dirty="0" err="1"/>
               <a:t>bust</a:t>
             </a:r>
             <a:r>
-              <a:rPr lang="de-DE" sz="2800"/>
+              <a:rPr lang="de-DE" sz="2800" dirty="0"/>
               <a:t>), was zum sofortigen Verlieren der Runde führt.</a:t>
             </a:r>
             <a:br>
-              <a:rPr lang="de-DE" sz="2800"/>
+              <a:rPr lang="de-DE" sz="2800" dirty="0"/>
             </a:br>
-            <a:endParaRPr lang="de-DE" sz="2800"/>
+            <a:endParaRPr lang="de-DE" sz="2800" dirty="0"/>
           </a:p>
           <a:p>
             <a:pPr marL="269875" indent="-269875">
@@ -11652,41 +11786,41 @@
               </a:tabLst>
             </a:pPr>
             <a:r>
-              <a:rPr lang="de-DE" sz="2800"/>
+              <a:rPr lang="de-DE" sz="2800" dirty="0"/>
               <a:t>Dabei zählen die Karten wie folgt:</a:t>
             </a:r>
             <a:br>
-              <a:rPr lang="de-DE" sz="2800"/>
+              <a:rPr lang="de-DE" sz="2800" dirty="0"/>
             </a:br>
             <a:r>
-              <a:rPr lang="de-DE" sz="2800"/>
+              <a:rPr lang="de-DE" sz="2800" dirty="0"/>
               <a:t/>
             </a:r>
             <a:br>
-              <a:rPr lang="de-DE" sz="2800"/>
+              <a:rPr lang="de-DE" sz="2800" dirty="0"/>
             </a:br>
             <a:r>
-              <a:rPr lang="de-DE" sz="2800"/>
+              <a:rPr lang="de-DE" sz="2800" dirty="0"/>
               <a:t>2 bis 10:	2 bis 10 Punkte</a:t>
             </a:r>
             <a:br>
-              <a:rPr lang="de-DE" sz="2800"/>
+              <a:rPr lang="de-DE" sz="2800" dirty="0"/>
             </a:br>
             <a:r>
-              <a:rPr lang="de-DE" sz="2800"/>
+              <a:rPr lang="de-DE" sz="2800" dirty="0"/>
               <a:t>Bildkarte:	10 Punkte</a:t>
             </a:r>
             <a:br>
-              <a:rPr lang="de-DE" sz="2800"/>
+              <a:rPr lang="de-DE" sz="2800" dirty="0"/>
             </a:br>
             <a:r>
-              <a:rPr lang="de-DE" sz="2800"/>
+              <a:rPr lang="de-DE" sz="2800" dirty="0"/>
               <a:t>Ass:        	nach Belieben 1 Punkt oder 11 Punkte</a:t>
             </a:r>
             <a:br>
-              <a:rPr lang="de-DE" sz="2800"/>
+              <a:rPr lang="de-DE" sz="2800" dirty="0"/>
             </a:br>
-            <a:endParaRPr lang="de-DE" sz="2800"/>
+            <a:endParaRPr lang="de-DE" sz="2800" dirty="0"/>
           </a:p>
           <a:p>
             <a:pPr marL="269875" indent="-269875">
@@ -11711,7 +11845,7 @@
                 <a:tab pos="8686800" algn="l"/>
               </a:tabLst>
             </a:pPr>
-            <a:endParaRPr lang="de-DE"/>
+            <a:endParaRPr lang="de-DE" dirty="0"/>
           </a:p>
           <a:p>
             <a:pPr marL="269875" indent="-269875">
@@ -11736,7 +11870,7 @@
                 <a:tab pos="8686800" algn="l"/>
               </a:tabLst>
             </a:pPr>
-            <a:endParaRPr lang="de-DE"/>
+            <a:endParaRPr lang="de-DE" dirty="0"/>
           </a:p>
         </p:txBody>
       </p:sp>
@@ -11974,13 +12108,13 @@
               </a:tabLst>
             </a:pPr>
             <a:r>
-              <a:rPr lang="de-DE" sz="2800"/>
+              <a:rPr lang="de-DE" sz="2800" dirty="0"/>
               <a:t>Will der Spieler keine weitere Karte, so ist der Kartengeber an der Reihe: Er zieht solange Karten, wie er 16 oder weniger Punkte hat, sobald er 17 oder mehr Punkte hat, hört er auf.</a:t>
             </a:r>
             <a:br>
-              <a:rPr lang="de-DE" sz="2800"/>
+              <a:rPr lang="de-DE" sz="2800" dirty="0"/>
             </a:br>
-            <a:endParaRPr lang="de-DE" sz="2800"/>
+            <a:endParaRPr lang="de-DE" sz="2800" dirty="0"/>
           </a:p>
           <a:p>
             <a:pPr marL="269875" indent="-269875">
@@ -12006,7 +12140,7 @@
               </a:tabLst>
             </a:pPr>
             <a:r>
-              <a:rPr lang="de-DE" sz="2800"/>
+              <a:rPr lang="de-DE" sz="2800" dirty="0"/>
               <a:t>Der Geber muss jedes Ass mit 11 Punkten zählen, es sei denn, er würde bei über 21 Punkten landen.</a:t>
             </a:r>
           </a:p>
@@ -12033,7 +12167,7 @@
                 <a:tab pos="8686800" algn="l"/>
               </a:tabLst>
             </a:pPr>
-            <a:endParaRPr lang="de-DE"/>
+            <a:endParaRPr lang="de-DE" dirty="0"/>
           </a:p>
           <a:p>
             <a:pPr marL="269875" indent="-269875">
@@ -12058,7 +12192,7 @@
                 <a:tab pos="8686800" algn="l"/>
               </a:tabLst>
             </a:pPr>
-            <a:endParaRPr lang="de-DE"/>
+            <a:endParaRPr lang="de-DE" dirty="0"/>
           </a:p>
         </p:txBody>
       </p:sp>
@@ -12293,7 +12427,7 @@
               </a:tabLst>
             </a:pPr>
             <a:r>
-              <a:rPr lang="de-DE" sz="2800"/>
+              <a:rPr lang="de-DE" sz="2800" dirty="0"/>
               <a:t>Beendigung des Spiels:</a:t>
             </a:r>
           </a:p>
@@ -12317,7 +12451,7 @@
                 <a:tab pos="8686800" algn="l"/>
               </a:tabLst>
             </a:pPr>
-            <a:endParaRPr lang="de-DE" sz="2800"/>
+            <a:endParaRPr lang="de-DE" sz="2800" dirty="0"/>
           </a:p>
           <a:p>
             <a:pPr marL="269875" indent="-269875">
@@ -12343,20 +12477,20 @@
               </a:tabLst>
             </a:pPr>
             <a:r>
-              <a:rPr lang="de-DE" sz="2800"/>
+              <a:rPr lang="de-DE" sz="2800" dirty="0"/>
               <a:t>Der Spieler zieht zu viele Karten und hat über</a:t>
             </a:r>
             <a:br>
-              <a:rPr lang="de-DE" sz="2800"/>
+              <a:rPr lang="de-DE" sz="2800" dirty="0"/>
             </a:br>
             <a:r>
-              <a:rPr lang="de-DE" sz="2800"/>
+              <a:rPr lang="de-DE" sz="2800" dirty="0"/>
               <a:t>21 Punkte (Geber gewinnt).</a:t>
             </a:r>
             <a:br>
-              <a:rPr lang="de-DE" sz="2800"/>
+              <a:rPr lang="de-DE" sz="2800" dirty="0"/>
             </a:br>
-            <a:endParaRPr lang="de-DE" sz="2800"/>
+            <a:endParaRPr lang="de-DE" sz="2800" dirty="0"/>
           </a:p>
           <a:p>
             <a:pPr marL="269875" indent="-269875">
@@ -12382,21 +12516,21 @@
               </a:tabLst>
             </a:pPr>
             <a:r>
-              <a:rPr lang="de-DE" sz="2800"/>
+              <a:rPr lang="de-DE" sz="2800" dirty="0"/>
               <a:t>Der Geber zieht zu viele Karten und hat über</a:t>
             </a:r>
             <a:br>
-              <a:rPr lang="de-DE" sz="2800"/>
+              <a:rPr lang="de-DE" sz="2800" dirty="0"/>
             </a:br>
             <a:r>
-              <a:rPr lang="de-DE" sz="2800"/>
+              <a:rPr lang="de-DE" sz="2800" dirty="0"/>
               <a:t>21 Punkte (Spieler gewinnt).</a:t>
             </a:r>
             <a:br>
-              <a:rPr lang="de-DE" sz="2800"/>
+              <a:rPr lang="de-DE" sz="2800" dirty="0"/>
             </a:br>
             <a:r>
-              <a:rPr lang="de-DE" sz="2800"/>
+              <a:rPr lang="de-DE" sz="2800" dirty="0"/>
               <a:t> </a:t>
             </a:r>
           </a:p>
@@ -12424,21 +12558,21 @@
               </a:tabLst>
             </a:pPr>
             <a:r>
-              <a:rPr lang="de-DE" sz="2800"/>
+              <a:rPr lang="de-DE" sz="2800" dirty="0"/>
               <a:t>Der Spieler hat 21 oder weniger Punkte, und der</a:t>
             </a:r>
             <a:br>
-              <a:rPr lang="de-DE" sz="2800"/>
+              <a:rPr lang="de-DE" sz="2800" dirty="0"/>
             </a:br>
             <a:r>
-              <a:rPr lang="de-DE" sz="2800"/>
+              <a:rPr lang="de-DE" sz="2800" dirty="0"/>
               <a:t>Geber hat zwischen 17 und 21 Punkten – es</a:t>
             </a:r>
             <a:br>
-              <a:rPr lang="de-DE" sz="2800"/>
+              <a:rPr lang="de-DE" sz="2800" dirty="0"/>
             </a:br>
             <a:r>
-              <a:rPr lang="de-DE" sz="2800"/>
+              <a:rPr lang="de-DE" sz="2800" dirty="0"/>
               <a:t>gewinnt derjenige, der mehr Punkte hat. Bei gleich vielen Punkten endet das Spiel unentschieden.</a:t>
             </a:r>
           </a:p>
@@ -12465,7 +12599,7 @@
                 <a:tab pos="8686800" algn="l"/>
               </a:tabLst>
             </a:pPr>
-            <a:endParaRPr lang="de-DE"/>
+            <a:endParaRPr lang="de-DE" dirty="0"/>
           </a:p>
           <a:p>
             <a:pPr marL="269875" indent="-269875">
@@ -12490,7 +12624,7 @@
                 <a:tab pos="8686800" algn="l"/>
               </a:tabLst>
             </a:pPr>
-            <a:endParaRPr lang="de-DE"/>
+            <a:endParaRPr lang="de-DE" dirty="0"/>
           </a:p>
         </p:txBody>
       </p:sp>
@@ -12670,12 +12804,20 @@
               </a:tabLst>
             </a:pPr>
             <a:r>
-              <a:rPr lang="de-DE" sz="4000">
+              <a:rPr lang="de-DE" sz="4000" dirty="0" smtClean="0">
                 <a:solidFill>
                   <a:srgbClr val="FFFFFF"/>
                 </a:solidFill>
               </a:rPr>
-              <a:t>Übung 1 (1)</a:t>
+              <a:t>Teil </a:t>
+            </a:r>
+            <a:r>
+              <a:rPr lang="de-DE" sz="4000" dirty="0">
+                <a:solidFill>
+                  <a:srgbClr val="FFFFFF"/>
+                </a:solidFill>
+              </a:rPr>
+              <a:t>1 (1)</a:t>
             </a:r>
           </a:p>
         </p:txBody>
@@ -12728,23 +12870,23 @@
               </a:tabLst>
             </a:pPr>
             <a:r>
-              <a:rPr lang="de-DE" sz="2800"/>
+              <a:rPr lang="de-DE" sz="2800" dirty="0"/>
               <a:t>Schreiben Sie eine Klasse </a:t>
             </a:r>
             <a:r>
-              <a:rPr lang="de-DE" sz="2800">
+              <a:rPr lang="de-DE" sz="2800" dirty="0">
                 <a:latin typeface="Courier New" pitchFamily="49" charset="0"/>
               </a:rPr>
               <a:t>Spielkarte</a:t>
             </a:r>
             <a:r>
-              <a:rPr lang="de-DE" sz="2800"/>
+              <a:rPr lang="de-DE" sz="2800" dirty="0"/>
               <a:t>, welche die Farbe (Pik, Kreuz, Herz, Karo) und den Kartenwert (Zwei, ..., Zehn, Bube, Dame, König, Ass) kennt.</a:t>
             </a:r>
             <a:br>
-              <a:rPr lang="de-DE" sz="2800"/>
+              <a:rPr lang="de-DE" sz="2800" dirty="0"/>
             </a:br>
-            <a:endParaRPr lang="de-DE" sz="2800"/>
+            <a:endParaRPr lang="de-DE" sz="2800" dirty="0"/>
           </a:p>
           <a:p>
             <a:pPr marL="269875" indent="-269875">
@@ -12770,14 +12912,14 @@
               </a:tabLst>
             </a:pPr>
             <a:r>
-              <a:rPr lang="de-DE" sz="2800"/>
+              <a:rPr lang="de-DE" sz="2800" dirty="0"/>
               <a:t>Eine Spielkarte sollte sich nach der Erzeugung nicht mehr verändern.</a:t>
             </a:r>
             <a:br>
-              <a:rPr lang="de-DE" sz="2800"/>
+              <a:rPr lang="de-DE" sz="2800" dirty="0"/>
             </a:br>
             <a:r>
-              <a:rPr lang="de-DE" sz="2800"/>
+              <a:rPr lang="de-DE" sz="2800" dirty="0"/>
               <a:t> </a:t>
             </a:r>
           </a:p>
@@ -12804,7 +12946,7 @@
                 <a:tab pos="8686800" algn="l"/>
               </a:tabLst>
             </a:pPr>
-            <a:endParaRPr lang="de-DE" sz="2800"/>
+            <a:endParaRPr lang="de-DE" sz="2800" dirty="0"/>
           </a:p>
           <a:p>
             <a:pPr marL="269875" indent="-269875">
@@ -12829,7 +12971,7 @@
                 <a:tab pos="8686800" algn="l"/>
               </a:tabLst>
             </a:pPr>
-            <a:endParaRPr lang="de-DE"/>
+            <a:endParaRPr lang="de-DE" dirty="0"/>
           </a:p>
           <a:p>
             <a:pPr marL="269875" indent="-269875">
@@ -12854,7 +12996,7 @@
                 <a:tab pos="8686800" algn="l"/>
               </a:tabLst>
             </a:pPr>
-            <a:endParaRPr lang="de-DE"/>
+            <a:endParaRPr lang="de-DE" dirty="0"/>
           </a:p>
         </p:txBody>
       </p:sp>
@@ -13034,12 +13176,20 @@
               </a:tabLst>
             </a:pPr>
             <a:r>
-              <a:rPr lang="de-DE" sz="4000">
+              <a:rPr lang="de-DE" sz="4000" dirty="0" smtClean="0">
                 <a:solidFill>
                   <a:srgbClr val="FFFFFF"/>
                 </a:solidFill>
               </a:rPr>
-              <a:t>Übung 1 (2)</a:t>
+              <a:t>Teil </a:t>
+            </a:r>
+            <a:r>
+              <a:rPr lang="de-DE" sz="4000" dirty="0">
+                <a:solidFill>
+                  <a:srgbClr val="FFFFFF"/>
+                </a:solidFill>
+              </a:rPr>
+              <a:t>1 (2)</a:t>
             </a:r>
           </a:p>
         </p:txBody>
@@ -13092,30 +13242,30 @@
               </a:tabLst>
             </a:pPr>
             <a:r>
-              <a:rPr lang="de-DE" sz="2800"/>
+              <a:rPr lang="de-DE" sz="2800" dirty="0"/>
               <a:t>Schreiben Sie eine Klasse </a:t>
             </a:r>
             <a:r>
-              <a:rPr lang="de-DE" sz="2800">
+              <a:rPr lang="de-DE" sz="2800" dirty="0">
                 <a:latin typeface="Courier New" pitchFamily="49" charset="0"/>
               </a:rPr>
               <a:t>Kartenstapel</a:t>
             </a:r>
             <a:r>
-              <a:rPr lang="de-DE" sz="2800"/>
+              <a:rPr lang="de-DE" sz="2800" dirty="0"/>
               <a:t>, welche</a:t>
             </a:r>
             <a:br>
-              <a:rPr lang="de-DE" sz="2800"/>
+              <a:rPr lang="de-DE" sz="2800" dirty="0"/>
             </a:br>
             <a:r>
-              <a:rPr lang="de-DE" sz="2800"/>
+              <a:rPr lang="de-DE" sz="2800" dirty="0"/>
               <a:t>alle 52 Spielkarten enthält. Objekte der Klasse sollen Auskunft darüber geben können, wie viele Karten noch auf dem Stapel sind, und man soll sich die oberste Karte geben lassen können.</a:t>
             </a:r>
             <a:br>
-              <a:rPr lang="de-DE" sz="2800"/>
+              <a:rPr lang="de-DE" sz="2800" dirty="0"/>
             </a:br>
-            <a:endParaRPr lang="de-DE" sz="2800"/>
+            <a:endParaRPr lang="de-DE" sz="2800" dirty="0"/>
           </a:p>
           <a:p>
             <a:pPr marL="269875" indent="-269875">
@@ -13141,7 +13291,7 @@
               </a:tabLst>
             </a:pPr>
             <a:r>
-              <a:rPr lang="de-DE" sz="2800"/>
+              <a:rPr lang="de-DE" sz="2800" dirty="0"/>
               <a:t>Bei der Erzeugung eines Kartenstapels sollen die Karten gemischt werden.</a:t>
             </a:r>
           </a:p>
@@ -13168,7 +13318,7 @@
                 <a:tab pos="8686800" algn="l"/>
               </a:tabLst>
             </a:pPr>
-            <a:endParaRPr lang="de-DE"/>
+            <a:endParaRPr lang="de-DE" dirty="0"/>
           </a:p>
           <a:p>
             <a:pPr marL="269875" indent="-269875">
@@ -13193,7 +13343,7 @@
                 <a:tab pos="8686800" algn="l"/>
               </a:tabLst>
             </a:pPr>
-            <a:endParaRPr lang="de-DE"/>
+            <a:endParaRPr lang="de-DE" dirty="0"/>
           </a:p>
         </p:txBody>
       </p:sp>

</xml_diff>